<commit_message>
update to teow routine
</commit_message>
<xml_diff>
--- a/docs/Workflow_diagram_template.pptx
+++ b/docs/Workflow_diagram_template.pptx
@@ -5,11 +5,12 @@
     <p:sldMasterId id="2147483648" r:id="rId1"/>
   </p:sldMasterIdLst>
   <p:notesMasterIdLst>
-    <p:notesMasterId r:id="rId4"/>
+    <p:notesMasterId r:id="rId5"/>
   </p:notesMasterIdLst>
   <p:sldIdLst>
     <p:sldId id="294" r:id="rId2"/>
     <p:sldId id="295" r:id="rId3"/>
+    <p:sldId id="296" r:id="rId4"/>
   </p:sldIdLst>
   <p:sldSz cx="12192000" cy="6858000"/>
   <p:notesSz cx="6858000" cy="9144000"/>
@@ -209,7 +210,7 @@
           <a:p>
             <a:fld id="{BA4F6571-EA3F-404B-893F-52399FD742AC}" type="datetimeFigureOut">
               <a:rPr lang="de-DE" smtClean="0"/>
-              <a:t>17.12.19</a:t>
+              <a:t>15.03.21</a:t>
             </a:fld>
             <a:endParaRPr lang="de-DE"/>
           </a:p>
@@ -625,7 +626,7 @@
           <a:p>
             <a:fld id="{A449A29F-D911-994F-8080-34C904F031BC}" type="datetimeFigureOut">
               <a:rPr lang="de-DE" smtClean="0"/>
-              <a:t>17.12.19</a:t>
+              <a:t>15.03.21</a:t>
             </a:fld>
             <a:endParaRPr lang="de-DE"/>
           </a:p>
@@ -825,7 +826,7 @@
           <a:p>
             <a:fld id="{A449A29F-D911-994F-8080-34C904F031BC}" type="datetimeFigureOut">
               <a:rPr lang="de-DE" smtClean="0"/>
-              <a:t>17.12.19</a:t>
+              <a:t>15.03.21</a:t>
             </a:fld>
             <a:endParaRPr lang="de-DE"/>
           </a:p>
@@ -1035,7 +1036,7 @@
           <a:p>
             <a:fld id="{A449A29F-D911-994F-8080-34C904F031BC}" type="datetimeFigureOut">
               <a:rPr lang="de-DE" smtClean="0"/>
-              <a:t>17.12.19</a:t>
+              <a:t>15.03.21</a:t>
             </a:fld>
             <a:endParaRPr lang="de-DE"/>
           </a:p>
@@ -1235,7 +1236,7 @@
           <a:p>
             <a:fld id="{A449A29F-D911-994F-8080-34C904F031BC}" type="datetimeFigureOut">
               <a:rPr lang="de-DE" smtClean="0"/>
-              <a:t>17.12.19</a:t>
+              <a:t>15.03.21</a:t>
             </a:fld>
             <a:endParaRPr lang="de-DE"/>
           </a:p>
@@ -1511,7 +1512,7 @@
           <a:p>
             <a:fld id="{A449A29F-D911-994F-8080-34C904F031BC}" type="datetimeFigureOut">
               <a:rPr lang="de-DE" smtClean="0"/>
-              <a:t>17.12.19</a:t>
+              <a:t>15.03.21</a:t>
             </a:fld>
             <a:endParaRPr lang="de-DE"/>
           </a:p>
@@ -1779,7 +1780,7 @@
           <a:p>
             <a:fld id="{A449A29F-D911-994F-8080-34C904F031BC}" type="datetimeFigureOut">
               <a:rPr lang="de-DE" smtClean="0"/>
-              <a:t>17.12.19</a:t>
+              <a:t>15.03.21</a:t>
             </a:fld>
             <a:endParaRPr lang="de-DE"/>
           </a:p>
@@ -2194,7 +2195,7 @@
           <a:p>
             <a:fld id="{A449A29F-D911-994F-8080-34C904F031BC}" type="datetimeFigureOut">
               <a:rPr lang="de-DE" smtClean="0"/>
-              <a:t>17.12.19</a:t>
+              <a:t>15.03.21</a:t>
             </a:fld>
             <a:endParaRPr lang="de-DE"/>
           </a:p>
@@ -2336,7 +2337,7 @@
           <a:p>
             <a:fld id="{A449A29F-D911-994F-8080-34C904F031BC}" type="datetimeFigureOut">
               <a:rPr lang="de-DE" smtClean="0"/>
-              <a:t>17.12.19</a:t>
+              <a:t>15.03.21</a:t>
             </a:fld>
             <a:endParaRPr lang="de-DE"/>
           </a:p>
@@ -2449,7 +2450,7 @@
           <a:p>
             <a:fld id="{A449A29F-D911-994F-8080-34C904F031BC}" type="datetimeFigureOut">
               <a:rPr lang="de-DE" smtClean="0"/>
-              <a:t>17.12.19</a:t>
+              <a:t>15.03.21</a:t>
             </a:fld>
             <a:endParaRPr lang="de-DE"/>
           </a:p>
@@ -2762,7 +2763,7 @@
           <a:p>
             <a:fld id="{A449A29F-D911-994F-8080-34C904F031BC}" type="datetimeFigureOut">
               <a:rPr lang="de-DE" smtClean="0"/>
-              <a:t>17.12.19</a:t>
+              <a:t>15.03.21</a:t>
             </a:fld>
             <a:endParaRPr lang="de-DE"/>
           </a:p>
@@ -3051,7 +3052,7 @@
           <a:p>
             <a:fld id="{A449A29F-D911-994F-8080-34C904F031BC}" type="datetimeFigureOut">
               <a:rPr lang="de-DE" smtClean="0"/>
-              <a:t>17.12.19</a:t>
+              <a:t>15.03.21</a:t>
             </a:fld>
             <a:endParaRPr lang="de-DE"/>
           </a:p>
@@ -3294,7 +3295,7 @@
           <a:p>
             <a:fld id="{A449A29F-D911-994F-8080-34C904F031BC}" type="datetimeFigureOut">
               <a:rPr lang="de-DE" smtClean="0"/>
-              <a:t>17.12.19</a:t>
+              <a:t>15.03.21</a:t>
             </a:fld>
             <a:endParaRPr lang="de-DE"/>
           </a:p>
@@ -8127,6 +8128,2008 @@
 </p:sld>
 </file>
 
+<file path=ppt/slides/slide3.xml><?xml version="1.0" encoding="utf-8"?>
+<p:sld xmlns:a="http://schemas.openxmlformats.org/drawingml/2006/main" xmlns:r="http://schemas.openxmlformats.org/officeDocument/2006/relationships" xmlns:p="http://schemas.openxmlformats.org/presentationml/2006/main">
+  <p:cSld>
+    <p:spTree>
+      <p:nvGrpSpPr>
+        <p:cNvPr id="1" name=""/>
+        <p:cNvGrpSpPr/>
+        <p:nvPr/>
+      </p:nvGrpSpPr>
+      <p:grpSpPr>
+        <a:xfrm>
+          <a:off x="0" y="0"/>
+          <a:ext cx="0" cy="0"/>
+          <a:chOff x="0" y="0"/>
+          <a:chExt cx="0" cy="0"/>
+        </a:xfrm>
+      </p:grpSpPr>
+      <p:sp>
+        <p:nvSpPr>
+          <p:cNvPr id="4" name="Rounded Rectangle 3">
+            <a:extLst>
+              <a:ext uri="{FF2B5EF4-FFF2-40B4-BE49-F238E27FC236}">
+                <a16:creationId xmlns:a16="http://schemas.microsoft.com/office/drawing/2014/main" id="{BE707DB2-7CCD-9843-9476-2002FC76CE00}"/>
+              </a:ext>
+            </a:extLst>
+          </p:cNvPr>
+          <p:cNvSpPr/>
+          <p:nvPr/>
+        </p:nvSpPr>
+        <p:spPr>
+          <a:xfrm>
+            <a:off x="525491" y="592408"/>
+            <a:ext cx="1931959" cy="6097477"/>
+          </a:xfrm>
+          <a:prstGeom prst="roundRect">
+            <a:avLst>
+              <a:gd name="adj" fmla="val 7208"/>
+            </a:avLst>
+          </a:prstGeom>
+          <a:solidFill>
+            <a:schemeClr val="bg1"/>
+          </a:solidFill>
+          <a:ln>
+            <a:solidFill>
+              <a:schemeClr val="bg1">
+                <a:lumMod val="50000"/>
+              </a:schemeClr>
+            </a:solidFill>
+            <a:prstDash val="dash"/>
+          </a:ln>
+        </p:spPr>
+        <p:style>
+          <a:lnRef idx="2">
+            <a:schemeClr val="accent1">
+              <a:shade val="50000"/>
+            </a:schemeClr>
+          </a:lnRef>
+          <a:fillRef idx="1">
+            <a:schemeClr val="accent1"/>
+          </a:fillRef>
+          <a:effectRef idx="0">
+            <a:schemeClr val="accent1"/>
+          </a:effectRef>
+          <a:fontRef idx="minor">
+            <a:schemeClr val="lt1"/>
+          </a:fontRef>
+        </p:style>
+        <p:txBody>
+          <a:bodyPr rtlCol="0" anchor="t"/>
+          <a:lstStyle/>
+          <a:p>
+            <a:pPr algn="r"/>
+            <a:r>
+              <a:rPr lang="en-US" sz="1200" dirty="0">
+                <a:solidFill>
+                  <a:schemeClr val="tx1">
+                    <a:lumMod val="65000"/>
+                    <a:lumOff val="35000"/>
+                  </a:schemeClr>
+                </a:solidFill>
+              </a:rPr>
+              <a:t>Download</a:t>
+            </a:r>
+          </a:p>
+        </p:txBody>
+      </p:sp>
+      <p:sp>
+        <p:nvSpPr>
+          <p:cNvPr id="5" name="Rounded Rectangle 4">
+            <a:extLst>
+              <a:ext uri="{FF2B5EF4-FFF2-40B4-BE49-F238E27FC236}">
+                <a16:creationId xmlns:a16="http://schemas.microsoft.com/office/drawing/2014/main" id="{A01BE842-F353-0041-9C08-DB1EB37C0717}"/>
+              </a:ext>
+            </a:extLst>
+          </p:cNvPr>
+          <p:cNvSpPr/>
+          <p:nvPr/>
+        </p:nvSpPr>
+        <p:spPr>
+          <a:xfrm>
+            <a:off x="2671077" y="592407"/>
+            <a:ext cx="1931959" cy="6097477"/>
+          </a:xfrm>
+          <a:prstGeom prst="roundRect">
+            <a:avLst>
+              <a:gd name="adj" fmla="val 7208"/>
+            </a:avLst>
+          </a:prstGeom>
+          <a:solidFill>
+            <a:schemeClr val="bg1"/>
+          </a:solidFill>
+          <a:ln>
+            <a:solidFill>
+              <a:schemeClr val="bg1">
+                <a:lumMod val="50000"/>
+              </a:schemeClr>
+            </a:solidFill>
+            <a:prstDash val="dash"/>
+          </a:ln>
+        </p:spPr>
+        <p:style>
+          <a:lnRef idx="2">
+            <a:schemeClr val="accent1">
+              <a:shade val="50000"/>
+            </a:schemeClr>
+          </a:lnRef>
+          <a:fillRef idx="1">
+            <a:schemeClr val="accent1"/>
+          </a:fillRef>
+          <a:effectRef idx="0">
+            <a:schemeClr val="accent1"/>
+          </a:effectRef>
+          <a:fontRef idx="minor">
+            <a:schemeClr val="lt1"/>
+          </a:fontRef>
+        </p:style>
+        <p:txBody>
+          <a:bodyPr rtlCol="0" anchor="t"/>
+          <a:lstStyle/>
+          <a:p>
+            <a:pPr algn="r"/>
+            <a:r>
+              <a:rPr lang="en-US" sz="1200" dirty="0">
+                <a:solidFill>
+                  <a:schemeClr val="tx1">
+                    <a:lumMod val="65000"/>
+                    <a:lumOff val="35000"/>
+                  </a:schemeClr>
+                </a:solidFill>
+              </a:rPr>
+              <a:t>Data Preprocessing</a:t>
+            </a:r>
+          </a:p>
+        </p:txBody>
+      </p:sp>
+      <p:sp>
+        <p:nvSpPr>
+          <p:cNvPr id="6" name="Rounded Rectangle 5">
+            <a:extLst>
+              <a:ext uri="{FF2B5EF4-FFF2-40B4-BE49-F238E27FC236}">
+                <a16:creationId xmlns:a16="http://schemas.microsoft.com/office/drawing/2014/main" id="{C94A93CF-1812-614E-ABC8-6CA800CE843E}"/>
+              </a:ext>
+            </a:extLst>
+          </p:cNvPr>
+          <p:cNvSpPr/>
+          <p:nvPr/>
+        </p:nvSpPr>
+        <p:spPr>
+          <a:xfrm>
+            <a:off x="4847699" y="592406"/>
+            <a:ext cx="1931959" cy="6097477"/>
+          </a:xfrm>
+          <a:prstGeom prst="roundRect">
+            <a:avLst>
+              <a:gd name="adj" fmla="val 7208"/>
+            </a:avLst>
+          </a:prstGeom>
+          <a:solidFill>
+            <a:schemeClr val="bg1"/>
+          </a:solidFill>
+          <a:ln>
+            <a:solidFill>
+              <a:schemeClr val="bg1">
+                <a:lumMod val="50000"/>
+              </a:schemeClr>
+            </a:solidFill>
+            <a:prstDash val="dash"/>
+          </a:ln>
+        </p:spPr>
+        <p:style>
+          <a:lnRef idx="2">
+            <a:schemeClr val="accent1">
+              <a:shade val="50000"/>
+            </a:schemeClr>
+          </a:lnRef>
+          <a:fillRef idx="1">
+            <a:schemeClr val="accent1"/>
+          </a:fillRef>
+          <a:effectRef idx="0">
+            <a:schemeClr val="accent1"/>
+          </a:effectRef>
+          <a:fontRef idx="minor">
+            <a:schemeClr val="lt1"/>
+          </a:fontRef>
+        </p:style>
+        <p:txBody>
+          <a:bodyPr rtlCol="0" anchor="t"/>
+          <a:lstStyle/>
+          <a:p>
+            <a:pPr algn="r"/>
+            <a:r>
+              <a:rPr lang="en-US" sz="1200" dirty="0">
+                <a:solidFill>
+                  <a:schemeClr val="tx1">
+                    <a:lumMod val="65000"/>
+                    <a:lumOff val="35000"/>
+                  </a:schemeClr>
+                </a:solidFill>
+              </a:rPr>
+              <a:t>Intersection</a:t>
+            </a:r>
+          </a:p>
+        </p:txBody>
+      </p:sp>
+      <p:sp>
+        <p:nvSpPr>
+          <p:cNvPr id="7" name="Rounded Rectangle 6">
+            <a:extLst>
+              <a:ext uri="{FF2B5EF4-FFF2-40B4-BE49-F238E27FC236}">
+                <a16:creationId xmlns:a16="http://schemas.microsoft.com/office/drawing/2014/main" id="{BD797DAE-D235-AD49-B298-52D7D8E9E136}"/>
+              </a:ext>
+            </a:extLst>
+          </p:cNvPr>
+          <p:cNvSpPr/>
+          <p:nvPr/>
+        </p:nvSpPr>
+        <p:spPr>
+          <a:xfrm>
+            <a:off x="6993285" y="592405"/>
+            <a:ext cx="1931959" cy="6097477"/>
+          </a:xfrm>
+          <a:prstGeom prst="roundRect">
+            <a:avLst>
+              <a:gd name="adj" fmla="val 7208"/>
+            </a:avLst>
+          </a:prstGeom>
+          <a:solidFill>
+            <a:schemeClr val="bg1"/>
+          </a:solidFill>
+          <a:ln>
+            <a:solidFill>
+              <a:schemeClr val="bg1">
+                <a:lumMod val="50000"/>
+              </a:schemeClr>
+            </a:solidFill>
+            <a:prstDash val="dash"/>
+          </a:ln>
+        </p:spPr>
+        <p:style>
+          <a:lnRef idx="2">
+            <a:schemeClr val="accent1">
+              <a:shade val="50000"/>
+            </a:schemeClr>
+          </a:lnRef>
+          <a:fillRef idx="1">
+            <a:schemeClr val="accent1"/>
+          </a:fillRef>
+          <a:effectRef idx="0">
+            <a:schemeClr val="accent1"/>
+          </a:effectRef>
+          <a:fontRef idx="minor">
+            <a:schemeClr val="lt1"/>
+          </a:fontRef>
+        </p:style>
+        <p:txBody>
+          <a:bodyPr rtlCol="0" anchor="t"/>
+          <a:lstStyle/>
+          <a:p>
+            <a:pPr algn="r"/>
+            <a:r>
+              <a:rPr lang="en-US" sz="1200" dirty="0">
+                <a:solidFill>
+                  <a:schemeClr val="tx1">
+                    <a:lumMod val="65000"/>
+                    <a:lumOff val="35000"/>
+                  </a:schemeClr>
+                </a:solidFill>
+              </a:rPr>
+              <a:t>Area Calculation</a:t>
+            </a:r>
+          </a:p>
+        </p:txBody>
+      </p:sp>
+      <p:sp>
+        <p:nvSpPr>
+          <p:cNvPr id="8" name="Rechteck 1">
+            <a:extLst>
+              <a:ext uri="{FF2B5EF4-FFF2-40B4-BE49-F238E27FC236}">
+                <a16:creationId xmlns:a16="http://schemas.microsoft.com/office/drawing/2014/main" id="{4895E5B7-682F-124E-8990-E7AFA8AB2D71}"/>
+              </a:ext>
+            </a:extLst>
+          </p:cNvPr>
+          <p:cNvSpPr/>
+          <p:nvPr/>
+        </p:nvSpPr>
+        <p:spPr>
+          <a:xfrm>
+            <a:off x="525490" y="208884"/>
+            <a:ext cx="11286608" cy="270710"/>
+          </a:xfrm>
+          <a:prstGeom prst="rect">
+            <a:avLst/>
+          </a:prstGeom>
+          <a:solidFill>
+            <a:schemeClr val="tx1"/>
+          </a:solidFill>
+          <a:ln>
+            <a:noFill/>
+          </a:ln>
+        </p:spPr>
+        <p:style>
+          <a:lnRef idx="2">
+            <a:schemeClr val="accent1">
+              <a:shade val="50000"/>
+            </a:schemeClr>
+          </a:lnRef>
+          <a:fillRef idx="1">
+            <a:schemeClr val="accent1"/>
+          </a:fillRef>
+          <a:effectRef idx="0">
+            <a:schemeClr val="accent1"/>
+          </a:effectRef>
+          <a:fontRef idx="minor">
+            <a:schemeClr val="lt1"/>
+          </a:fontRef>
+        </p:style>
+        <p:txBody>
+          <a:bodyPr rtlCol="0" anchor="ctr"/>
+          <a:lstStyle/>
+          <a:p>
+            <a:pPr algn="ctr"/>
+            <a:r>
+              <a:rPr lang="en-US" sz="1600" b="1" noProof="1">
+                <a:solidFill>
+                  <a:schemeClr val="bg1"/>
+                </a:solidFill>
+              </a:rPr>
+              <a:t>Workflow for calculating intersection areas of Polygon layers with WDPA</a:t>
+            </a:r>
+          </a:p>
+        </p:txBody>
+      </p:sp>
+      <p:sp>
+        <p:nvSpPr>
+          <p:cNvPr id="9" name="Document 8">
+            <a:extLst>
+              <a:ext uri="{FF2B5EF4-FFF2-40B4-BE49-F238E27FC236}">
+                <a16:creationId xmlns:a16="http://schemas.microsoft.com/office/drawing/2014/main" id="{8BF05924-062B-5E4E-84EC-40B6F84D2109}"/>
+              </a:ext>
+            </a:extLst>
+          </p:cNvPr>
+          <p:cNvSpPr/>
+          <p:nvPr/>
+        </p:nvSpPr>
+        <p:spPr>
+          <a:xfrm>
+            <a:off x="628443" y="1481580"/>
+            <a:ext cx="1531725" cy="585537"/>
+          </a:xfrm>
+          <a:prstGeom prst="flowChartDocument">
+            <a:avLst/>
+          </a:prstGeom>
+          <a:solidFill>
+            <a:schemeClr val="bg1"/>
+          </a:solidFill>
+          <a:ln>
+            <a:solidFill>
+              <a:schemeClr val="bg1">
+                <a:lumMod val="50000"/>
+              </a:schemeClr>
+            </a:solidFill>
+          </a:ln>
+        </p:spPr>
+        <p:style>
+          <a:lnRef idx="2">
+            <a:schemeClr val="accent1">
+              <a:shade val="50000"/>
+            </a:schemeClr>
+          </a:lnRef>
+          <a:fillRef idx="1">
+            <a:schemeClr val="accent1"/>
+          </a:fillRef>
+          <a:effectRef idx="0">
+            <a:schemeClr val="accent1"/>
+          </a:effectRef>
+          <a:fontRef idx="minor">
+            <a:schemeClr val="lt1"/>
+          </a:fontRef>
+        </p:style>
+        <p:txBody>
+          <a:bodyPr rtlCol="0" anchor="ctr"/>
+          <a:lstStyle/>
+          <a:p>
+            <a:pPr algn="ctr"/>
+            <a:r>
+              <a:rPr lang="en-US" sz="1200" dirty="0">
+                <a:solidFill>
+                  <a:schemeClr val="tx1">
+                    <a:lumMod val="65000"/>
+                    <a:lumOff val="35000"/>
+                  </a:schemeClr>
+                </a:solidFill>
+              </a:rPr>
+              <a:t>Load Polygon layer</a:t>
+            </a:r>
+          </a:p>
+          <a:p>
+            <a:pPr algn="ctr"/>
+            <a:r>
+              <a:rPr lang="en-US" sz="1200" dirty="0">
+                <a:solidFill>
+                  <a:schemeClr val="tx1">
+                    <a:lumMod val="65000"/>
+                    <a:lumOff val="35000"/>
+                  </a:schemeClr>
+                </a:solidFill>
+              </a:rPr>
+              <a:t>(sf)</a:t>
+            </a:r>
+          </a:p>
+        </p:txBody>
+      </p:sp>
+      <p:sp>
+        <p:nvSpPr>
+          <p:cNvPr id="10" name="Document 9">
+            <a:extLst>
+              <a:ext uri="{FF2B5EF4-FFF2-40B4-BE49-F238E27FC236}">
+                <a16:creationId xmlns:a16="http://schemas.microsoft.com/office/drawing/2014/main" id="{5ABFB447-29A9-5F49-B7E3-29A5540AA226}"/>
+              </a:ext>
+            </a:extLst>
+          </p:cNvPr>
+          <p:cNvSpPr/>
+          <p:nvPr/>
+        </p:nvSpPr>
+        <p:spPr>
+          <a:xfrm>
+            <a:off x="628442" y="3784984"/>
+            <a:ext cx="1531725" cy="585537"/>
+          </a:xfrm>
+          <a:prstGeom prst="flowChartDocument">
+            <a:avLst/>
+          </a:prstGeom>
+          <a:solidFill>
+            <a:schemeClr val="bg1"/>
+          </a:solidFill>
+          <a:ln>
+            <a:solidFill>
+              <a:schemeClr val="bg1">
+                <a:lumMod val="50000"/>
+              </a:schemeClr>
+            </a:solidFill>
+          </a:ln>
+        </p:spPr>
+        <p:style>
+          <a:lnRef idx="2">
+            <a:schemeClr val="accent1">
+              <a:shade val="50000"/>
+            </a:schemeClr>
+          </a:lnRef>
+          <a:fillRef idx="1">
+            <a:schemeClr val="accent1"/>
+          </a:fillRef>
+          <a:effectRef idx="0">
+            <a:schemeClr val="accent1"/>
+          </a:effectRef>
+          <a:fontRef idx="minor">
+            <a:schemeClr val="lt1"/>
+          </a:fontRef>
+        </p:style>
+        <p:txBody>
+          <a:bodyPr rtlCol="0" anchor="ctr"/>
+          <a:lstStyle/>
+          <a:p>
+            <a:pPr algn="ctr"/>
+            <a:r>
+              <a:rPr lang="en-US" sz="1200" dirty="0">
+                <a:solidFill>
+                  <a:schemeClr val="tx1">
+                    <a:lumMod val="65000"/>
+                    <a:lumOff val="35000"/>
+                  </a:schemeClr>
+                </a:solidFill>
+              </a:rPr>
+              <a:t>Use WDPA API (</a:t>
+            </a:r>
+            <a:r>
+              <a:rPr lang="en-US" sz="1200" dirty="0" err="1">
+                <a:solidFill>
+                  <a:schemeClr val="tx1">
+                    <a:lumMod val="65000"/>
+                    <a:lumOff val="35000"/>
+                  </a:schemeClr>
+                </a:solidFill>
+              </a:rPr>
+              <a:t>wdpar</a:t>
+            </a:r>
+            <a:r>
+              <a:rPr lang="en-US" sz="1200" dirty="0">
+                <a:solidFill>
+                  <a:schemeClr val="tx1">
+                    <a:lumMod val="65000"/>
+                    <a:lumOff val="35000"/>
+                  </a:schemeClr>
+                </a:solidFill>
+              </a:rPr>
+              <a:t>)</a:t>
+            </a:r>
+          </a:p>
+        </p:txBody>
+      </p:sp>
+      <p:sp>
+        <p:nvSpPr>
+          <p:cNvPr id="11" name="Document 10">
+            <a:extLst>
+              <a:ext uri="{FF2B5EF4-FFF2-40B4-BE49-F238E27FC236}">
+                <a16:creationId xmlns:a16="http://schemas.microsoft.com/office/drawing/2014/main" id="{EC806D42-F10E-E042-8C00-C1D918178A58}"/>
+              </a:ext>
+            </a:extLst>
+          </p:cNvPr>
+          <p:cNvSpPr/>
+          <p:nvPr/>
+        </p:nvSpPr>
+        <p:spPr>
+          <a:xfrm>
+            <a:off x="2886712" y="1481579"/>
+            <a:ext cx="1531725" cy="585537"/>
+          </a:xfrm>
+          <a:prstGeom prst="flowChartDocument">
+            <a:avLst/>
+          </a:prstGeom>
+          <a:solidFill>
+            <a:schemeClr val="bg1"/>
+          </a:solidFill>
+          <a:ln>
+            <a:solidFill>
+              <a:schemeClr val="bg1">
+                <a:lumMod val="50000"/>
+              </a:schemeClr>
+            </a:solidFill>
+          </a:ln>
+        </p:spPr>
+        <p:style>
+          <a:lnRef idx="2">
+            <a:schemeClr val="accent1">
+              <a:shade val="50000"/>
+            </a:schemeClr>
+          </a:lnRef>
+          <a:fillRef idx="1">
+            <a:schemeClr val="accent1"/>
+          </a:fillRef>
+          <a:effectRef idx="0">
+            <a:schemeClr val="accent1"/>
+          </a:effectRef>
+          <a:fontRef idx="minor">
+            <a:schemeClr val="lt1"/>
+          </a:fontRef>
+        </p:style>
+        <p:txBody>
+          <a:bodyPr rtlCol="0" anchor="ctr"/>
+          <a:lstStyle/>
+          <a:p>
+            <a:pPr algn="ctr"/>
+            <a:r>
+              <a:rPr lang="en-US" sz="1200" dirty="0">
+                <a:solidFill>
+                  <a:schemeClr val="tx1">
+                    <a:lumMod val="65000"/>
+                    <a:lumOff val="35000"/>
+                  </a:schemeClr>
+                </a:solidFill>
+              </a:rPr>
+              <a:t>Simplify geometry</a:t>
+            </a:r>
+          </a:p>
+          <a:p>
+            <a:pPr algn="ctr"/>
+            <a:r>
+              <a:rPr lang="en-US" sz="1200" dirty="0">
+                <a:solidFill>
+                  <a:schemeClr val="tx1">
+                    <a:lumMod val="65000"/>
+                    <a:lumOff val="35000"/>
+                  </a:schemeClr>
+                </a:solidFill>
+              </a:rPr>
+              <a:t>(</a:t>
+            </a:r>
+            <a:r>
+              <a:rPr lang="en-US" sz="1200" dirty="0" err="1">
+                <a:solidFill>
+                  <a:schemeClr val="tx1">
+                    <a:lumMod val="65000"/>
+                    <a:lumOff val="35000"/>
+                  </a:schemeClr>
+                </a:solidFill>
+              </a:rPr>
+              <a:t>rmapshaper</a:t>
+            </a:r>
+            <a:r>
+              <a:rPr lang="en-US" sz="1200" dirty="0">
+                <a:solidFill>
+                  <a:schemeClr val="tx1">
+                    <a:lumMod val="65000"/>
+                    <a:lumOff val="35000"/>
+                  </a:schemeClr>
+                </a:solidFill>
+              </a:rPr>
+              <a:t>)</a:t>
+            </a:r>
+          </a:p>
+        </p:txBody>
+      </p:sp>
+      <p:sp>
+        <p:nvSpPr>
+          <p:cNvPr id="14" name="Document 13">
+            <a:extLst>
+              <a:ext uri="{FF2B5EF4-FFF2-40B4-BE49-F238E27FC236}">
+                <a16:creationId xmlns:a16="http://schemas.microsoft.com/office/drawing/2014/main" id="{31EC29AC-0454-344F-934C-821A46472918}"/>
+              </a:ext>
+            </a:extLst>
+          </p:cNvPr>
+          <p:cNvSpPr/>
+          <p:nvPr/>
+        </p:nvSpPr>
+        <p:spPr>
+          <a:xfrm>
+            <a:off x="2871193" y="3758163"/>
+            <a:ext cx="1531725" cy="585537"/>
+          </a:xfrm>
+          <a:prstGeom prst="flowChartDocument">
+            <a:avLst/>
+          </a:prstGeom>
+          <a:solidFill>
+            <a:schemeClr val="bg1"/>
+          </a:solidFill>
+          <a:ln>
+            <a:solidFill>
+              <a:schemeClr val="bg1">
+                <a:lumMod val="50000"/>
+              </a:schemeClr>
+            </a:solidFill>
+          </a:ln>
+        </p:spPr>
+        <p:style>
+          <a:lnRef idx="2">
+            <a:schemeClr val="accent1">
+              <a:shade val="50000"/>
+            </a:schemeClr>
+          </a:lnRef>
+          <a:fillRef idx="1">
+            <a:schemeClr val="accent1"/>
+          </a:fillRef>
+          <a:effectRef idx="0">
+            <a:schemeClr val="accent1"/>
+          </a:effectRef>
+          <a:fontRef idx="minor">
+            <a:schemeClr val="lt1"/>
+          </a:fontRef>
+        </p:style>
+        <p:txBody>
+          <a:bodyPr rtlCol="0" anchor="ctr"/>
+          <a:lstStyle/>
+          <a:p>
+            <a:pPr algn="ctr"/>
+            <a:r>
+              <a:rPr lang="en-US" sz="1200" dirty="0">
+                <a:solidFill>
+                  <a:schemeClr val="tx1">
+                    <a:lumMod val="65000"/>
+                    <a:lumOff val="35000"/>
+                  </a:schemeClr>
+                </a:solidFill>
+              </a:rPr>
+              <a:t>Subset data</a:t>
+            </a:r>
+          </a:p>
+          <a:p>
+            <a:pPr algn="ctr"/>
+            <a:r>
+              <a:rPr lang="en-US" sz="1200" dirty="0">
+                <a:solidFill>
+                  <a:schemeClr val="tx1">
+                    <a:lumMod val="65000"/>
+                    <a:lumOff val="35000"/>
+                  </a:schemeClr>
+                </a:solidFill>
+              </a:rPr>
+              <a:t>(</a:t>
+            </a:r>
+            <a:r>
+              <a:rPr lang="en-US" sz="1200" dirty="0" err="1">
+                <a:solidFill>
+                  <a:schemeClr val="tx1">
+                    <a:lumMod val="65000"/>
+                    <a:lumOff val="35000"/>
+                  </a:schemeClr>
+                </a:solidFill>
+              </a:rPr>
+              <a:t>dplyr</a:t>
+            </a:r>
+            <a:r>
+              <a:rPr lang="en-US" sz="1200" dirty="0">
+                <a:solidFill>
+                  <a:schemeClr val="tx1">
+                    <a:lumMod val="65000"/>
+                    <a:lumOff val="35000"/>
+                  </a:schemeClr>
+                </a:solidFill>
+              </a:rPr>
+              <a:t>)</a:t>
+            </a:r>
+          </a:p>
+        </p:txBody>
+      </p:sp>
+      <p:sp>
+        <p:nvSpPr>
+          <p:cNvPr id="15" name="Document 14">
+            <a:extLst>
+              <a:ext uri="{FF2B5EF4-FFF2-40B4-BE49-F238E27FC236}">
+                <a16:creationId xmlns:a16="http://schemas.microsoft.com/office/drawing/2014/main" id="{04D5C8BA-5731-3242-AAB4-54AF11778D05}"/>
+              </a:ext>
+            </a:extLst>
+          </p:cNvPr>
+          <p:cNvSpPr/>
+          <p:nvPr/>
+        </p:nvSpPr>
+        <p:spPr>
+          <a:xfrm>
+            <a:off x="2869482" y="4609206"/>
+            <a:ext cx="1531725" cy="585537"/>
+          </a:xfrm>
+          <a:prstGeom prst="flowChartDocument">
+            <a:avLst/>
+          </a:prstGeom>
+          <a:solidFill>
+            <a:schemeClr val="bg1"/>
+          </a:solidFill>
+          <a:ln>
+            <a:solidFill>
+              <a:schemeClr val="bg1">
+                <a:lumMod val="50000"/>
+              </a:schemeClr>
+            </a:solidFill>
+          </a:ln>
+        </p:spPr>
+        <p:style>
+          <a:lnRef idx="2">
+            <a:schemeClr val="accent1">
+              <a:shade val="50000"/>
+            </a:schemeClr>
+          </a:lnRef>
+          <a:fillRef idx="1">
+            <a:schemeClr val="accent1"/>
+          </a:fillRef>
+          <a:effectRef idx="0">
+            <a:schemeClr val="accent1"/>
+          </a:effectRef>
+          <a:fontRef idx="minor">
+            <a:schemeClr val="lt1"/>
+          </a:fontRef>
+        </p:style>
+        <p:txBody>
+          <a:bodyPr rtlCol="0" anchor="ctr"/>
+          <a:lstStyle/>
+          <a:p>
+            <a:pPr algn="ctr"/>
+            <a:r>
+              <a:rPr lang="en-US" sz="1200" dirty="0">
+                <a:solidFill>
+                  <a:schemeClr val="tx1">
+                    <a:lumMod val="65000"/>
+                    <a:lumOff val="35000"/>
+                  </a:schemeClr>
+                </a:solidFill>
+              </a:rPr>
+              <a:t>Clean data</a:t>
+            </a:r>
+          </a:p>
+          <a:p>
+            <a:pPr algn="ctr"/>
+            <a:r>
+              <a:rPr lang="en-US" sz="1200" dirty="0">
+                <a:solidFill>
+                  <a:schemeClr val="tx1">
+                    <a:lumMod val="65000"/>
+                    <a:lumOff val="35000"/>
+                  </a:schemeClr>
+                </a:solidFill>
+              </a:rPr>
+              <a:t>(</a:t>
+            </a:r>
+            <a:r>
+              <a:rPr lang="en-US" sz="1200" dirty="0" err="1">
+                <a:solidFill>
+                  <a:schemeClr val="tx1">
+                    <a:lumMod val="65000"/>
+                    <a:lumOff val="35000"/>
+                  </a:schemeClr>
+                </a:solidFill>
+              </a:rPr>
+              <a:t>wdpar</a:t>
+            </a:r>
+            <a:r>
+              <a:rPr lang="en-US" sz="1200" dirty="0">
+                <a:solidFill>
+                  <a:schemeClr val="tx1">
+                    <a:lumMod val="65000"/>
+                    <a:lumOff val="35000"/>
+                  </a:schemeClr>
+                </a:solidFill>
+              </a:rPr>
+              <a:t>)</a:t>
+            </a:r>
+          </a:p>
+        </p:txBody>
+      </p:sp>
+      <p:sp>
+        <p:nvSpPr>
+          <p:cNvPr id="16" name="Document 15">
+            <a:extLst>
+              <a:ext uri="{FF2B5EF4-FFF2-40B4-BE49-F238E27FC236}">
+                <a16:creationId xmlns:a16="http://schemas.microsoft.com/office/drawing/2014/main" id="{1B1E4A36-7431-C549-9F02-CA5B60CD116F}"/>
+              </a:ext>
+            </a:extLst>
+          </p:cNvPr>
+          <p:cNvSpPr/>
+          <p:nvPr/>
+        </p:nvSpPr>
+        <p:spPr>
+          <a:xfrm>
+            <a:off x="5032295" y="2538015"/>
+            <a:ext cx="1531725" cy="585537"/>
+          </a:xfrm>
+          <a:prstGeom prst="flowChartDocument">
+            <a:avLst/>
+          </a:prstGeom>
+          <a:solidFill>
+            <a:schemeClr val="bg1"/>
+          </a:solidFill>
+          <a:ln>
+            <a:solidFill>
+              <a:schemeClr val="bg1">
+                <a:lumMod val="50000"/>
+              </a:schemeClr>
+            </a:solidFill>
+          </a:ln>
+        </p:spPr>
+        <p:style>
+          <a:lnRef idx="2">
+            <a:schemeClr val="accent1">
+              <a:shade val="50000"/>
+            </a:schemeClr>
+          </a:lnRef>
+          <a:fillRef idx="1">
+            <a:schemeClr val="accent1"/>
+          </a:fillRef>
+          <a:effectRef idx="0">
+            <a:schemeClr val="accent1"/>
+          </a:effectRef>
+          <a:fontRef idx="minor">
+            <a:schemeClr val="lt1"/>
+          </a:fontRef>
+        </p:style>
+        <p:txBody>
+          <a:bodyPr rtlCol="0" anchor="ctr"/>
+          <a:lstStyle/>
+          <a:p>
+            <a:pPr algn="ctr"/>
+            <a:r>
+              <a:rPr lang="en-US" sz="1200" dirty="0">
+                <a:solidFill>
+                  <a:schemeClr val="tx1">
+                    <a:lumMod val="65000"/>
+                    <a:lumOff val="35000"/>
+                  </a:schemeClr>
+                </a:solidFill>
+              </a:rPr>
+              <a:t>Reproject </a:t>
+            </a:r>
+            <a:r>
+              <a:rPr lang="en-US" sz="1200">
+                <a:solidFill>
+                  <a:schemeClr val="tx1">
+                    <a:lumMod val="65000"/>
+                    <a:lumOff val="35000"/>
+                  </a:schemeClr>
+                </a:solidFill>
+              </a:rPr>
+              <a:t>to tmerc</a:t>
+            </a:r>
+            <a:r>
+              <a:rPr lang="en-US" sz="1200" dirty="0">
+                <a:solidFill>
+                  <a:schemeClr val="tx1">
+                    <a:lumMod val="65000"/>
+                    <a:lumOff val="35000"/>
+                  </a:schemeClr>
+                </a:solidFill>
+              </a:rPr>
+              <a:t> (sf)</a:t>
+            </a:r>
+          </a:p>
+        </p:txBody>
+      </p:sp>
+      <p:sp>
+        <p:nvSpPr>
+          <p:cNvPr id="17" name="Document 16">
+            <a:extLst>
+              <a:ext uri="{FF2B5EF4-FFF2-40B4-BE49-F238E27FC236}">
+                <a16:creationId xmlns:a16="http://schemas.microsoft.com/office/drawing/2014/main" id="{4BCAF8AF-333A-344C-8078-6023FF72E9AE}"/>
+              </a:ext>
+            </a:extLst>
+          </p:cNvPr>
+          <p:cNvSpPr/>
+          <p:nvPr/>
+        </p:nvSpPr>
+        <p:spPr>
+          <a:xfrm>
+            <a:off x="5032296" y="3330352"/>
+            <a:ext cx="1531725" cy="585537"/>
+          </a:xfrm>
+          <a:prstGeom prst="flowChartDocument">
+            <a:avLst/>
+          </a:prstGeom>
+          <a:solidFill>
+            <a:schemeClr val="bg1"/>
+          </a:solidFill>
+          <a:ln>
+            <a:solidFill>
+              <a:schemeClr val="bg1">
+                <a:lumMod val="50000"/>
+              </a:schemeClr>
+            </a:solidFill>
+          </a:ln>
+        </p:spPr>
+        <p:style>
+          <a:lnRef idx="2">
+            <a:schemeClr val="accent1">
+              <a:shade val="50000"/>
+            </a:schemeClr>
+          </a:lnRef>
+          <a:fillRef idx="1">
+            <a:schemeClr val="accent1"/>
+          </a:fillRef>
+          <a:effectRef idx="0">
+            <a:schemeClr val="accent1"/>
+          </a:effectRef>
+          <a:fontRef idx="minor">
+            <a:schemeClr val="lt1"/>
+          </a:fontRef>
+        </p:style>
+        <p:txBody>
+          <a:bodyPr rtlCol="0" anchor="ctr"/>
+          <a:lstStyle/>
+          <a:p>
+            <a:pPr algn="ctr"/>
+            <a:r>
+              <a:rPr lang="en-US" sz="1200" dirty="0">
+                <a:solidFill>
+                  <a:schemeClr val="tx1">
+                    <a:lumMod val="65000"/>
+                    <a:lumOff val="35000"/>
+                  </a:schemeClr>
+                </a:solidFill>
+              </a:rPr>
+              <a:t>Intersect</a:t>
+            </a:r>
+          </a:p>
+          <a:p>
+            <a:pPr algn="ctr"/>
+            <a:r>
+              <a:rPr lang="en-US" sz="1200" dirty="0">
+                <a:solidFill>
+                  <a:schemeClr val="tx1">
+                    <a:lumMod val="65000"/>
+                    <a:lumOff val="35000"/>
+                  </a:schemeClr>
+                </a:solidFill>
+              </a:rPr>
+              <a:t>(sf)</a:t>
+            </a:r>
+          </a:p>
+        </p:txBody>
+      </p:sp>
+      <p:sp>
+        <p:nvSpPr>
+          <p:cNvPr id="18" name="Document 17">
+            <a:extLst>
+              <a:ext uri="{FF2B5EF4-FFF2-40B4-BE49-F238E27FC236}">
+                <a16:creationId xmlns:a16="http://schemas.microsoft.com/office/drawing/2014/main" id="{528F0F15-42C8-704D-B520-3F3AEE0A118D}"/>
+              </a:ext>
+            </a:extLst>
+          </p:cNvPr>
+          <p:cNvSpPr/>
+          <p:nvPr/>
+        </p:nvSpPr>
+        <p:spPr>
+          <a:xfrm>
+            <a:off x="7193401" y="3334680"/>
+            <a:ext cx="1531725" cy="585537"/>
+          </a:xfrm>
+          <a:prstGeom prst="flowChartDocument">
+            <a:avLst/>
+          </a:prstGeom>
+          <a:solidFill>
+            <a:schemeClr val="bg1"/>
+          </a:solidFill>
+          <a:ln>
+            <a:solidFill>
+              <a:schemeClr val="bg1">
+                <a:lumMod val="50000"/>
+              </a:schemeClr>
+            </a:solidFill>
+          </a:ln>
+        </p:spPr>
+        <p:style>
+          <a:lnRef idx="2">
+            <a:schemeClr val="accent1">
+              <a:shade val="50000"/>
+            </a:schemeClr>
+          </a:lnRef>
+          <a:fillRef idx="1">
+            <a:schemeClr val="accent1"/>
+          </a:fillRef>
+          <a:effectRef idx="0">
+            <a:schemeClr val="accent1"/>
+          </a:effectRef>
+          <a:fontRef idx="minor">
+            <a:schemeClr val="lt1"/>
+          </a:fontRef>
+        </p:style>
+        <p:txBody>
+          <a:bodyPr rtlCol="0" anchor="ctr"/>
+          <a:lstStyle/>
+          <a:p>
+            <a:pPr algn="ctr"/>
+            <a:r>
+              <a:rPr lang="en-US" sz="1200" dirty="0">
+                <a:solidFill>
+                  <a:schemeClr val="tx1">
+                    <a:lumMod val="65000"/>
+                    <a:lumOff val="35000"/>
+                  </a:schemeClr>
+                </a:solidFill>
+              </a:rPr>
+              <a:t>Project to LEA</a:t>
+            </a:r>
+          </a:p>
+          <a:p>
+            <a:pPr algn="ctr"/>
+            <a:r>
+              <a:rPr lang="en-US" sz="1200" dirty="0">
+                <a:solidFill>
+                  <a:schemeClr val="tx1">
+                    <a:lumMod val="65000"/>
+                    <a:lumOff val="35000"/>
+                  </a:schemeClr>
+                </a:solidFill>
+              </a:rPr>
+              <a:t>(sf + </a:t>
+            </a:r>
+            <a:r>
+              <a:rPr lang="en-US" sz="1200" dirty="0" err="1">
+                <a:solidFill>
+                  <a:schemeClr val="tx1">
+                    <a:lumMod val="65000"/>
+                    <a:lumOff val="35000"/>
+                  </a:schemeClr>
+                </a:solidFill>
+              </a:rPr>
+              <a:t>area_proj</a:t>
+            </a:r>
+            <a:r>
+              <a:rPr lang="en-US" sz="1200" dirty="0">
+                <a:solidFill>
+                  <a:schemeClr val="tx1">
+                    <a:lumMod val="65000"/>
+                    <a:lumOff val="35000"/>
+                  </a:schemeClr>
+                </a:solidFill>
+              </a:rPr>
+              <a:t>)</a:t>
+            </a:r>
+          </a:p>
+        </p:txBody>
+      </p:sp>
+      <p:sp>
+        <p:nvSpPr>
+          <p:cNvPr id="19" name="Document 18">
+            <a:extLst>
+              <a:ext uri="{FF2B5EF4-FFF2-40B4-BE49-F238E27FC236}">
+                <a16:creationId xmlns:a16="http://schemas.microsoft.com/office/drawing/2014/main" id="{968F0E76-13D1-E940-ABAE-FD8EA52B130A}"/>
+              </a:ext>
+            </a:extLst>
+          </p:cNvPr>
+          <p:cNvSpPr/>
+          <p:nvPr/>
+        </p:nvSpPr>
+        <p:spPr>
+          <a:xfrm>
+            <a:off x="7191690" y="4134350"/>
+            <a:ext cx="1531725" cy="585537"/>
+          </a:xfrm>
+          <a:prstGeom prst="flowChartDocument">
+            <a:avLst/>
+          </a:prstGeom>
+          <a:solidFill>
+            <a:schemeClr val="bg1"/>
+          </a:solidFill>
+          <a:ln>
+            <a:solidFill>
+              <a:schemeClr val="bg1">
+                <a:lumMod val="50000"/>
+              </a:schemeClr>
+            </a:solidFill>
+          </a:ln>
+        </p:spPr>
+        <p:style>
+          <a:lnRef idx="2">
+            <a:schemeClr val="accent1">
+              <a:shade val="50000"/>
+            </a:schemeClr>
+          </a:lnRef>
+          <a:fillRef idx="1">
+            <a:schemeClr val="accent1"/>
+          </a:fillRef>
+          <a:effectRef idx="0">
+            <a:schemeClr val="accent1"/>
+          </a:effectRef>
+          <a:fontRef idx="minor">
+            <a:schemeClr val="lt1"/>
+          </a:fontRef>
+        </p:style>
+        <p:txBody>
+          <a:bodyPr rtlCol="0" anchor="ctr"/>
+          <a:lstStyle/>
+          <a:p>
+            <a:pPr algn="ctr"/>
+            <a:r>
+              <a:rPr lang="en-US" sz="1200" dirty="0">
+                <a:solidFill>
+                  <a:schemeClr val="tx1">
+                    <a:lumMod val="65000"/>
+                    <a:lumOff val="35000"/>
+                  </a:schemeClr>
+                </a:solidFill>
+              </a:rPr>
+              <a:t>Area Calculation</a:t>
+            </a:r>
+          </a:p>
+          <a:p>
+            <a:pPr algn="ctr"/>
+            <a:r>
+              <a:rPr lang="en-US" sz="1200" dirty="0">
+                <a:solidFill>
+                  <a:schemeClr val="tx1">
+                    <a:lumMod val="65000"/>
+                    <a:lumOff val="35000"/>
+                  </a:schemeClr>
+                </a:solidFill>
+              </a:rPr>
+              <a:t>(sf)</a:t>
+            </a:r>
+          </a:p>
+        </p:txBody>
+      </p:sp>
+      <p:sp>
+        <p:nvSpPr>
+          <p:cNvPr id="21" name="Rounded Rectangle 15">
+            <a:extLst>
+              <a:ext uri="{FF2B5EF4-FFF2-40B4-BE49-F238E27FC236}">
+                <a16:creationId xmlns:a16="http://schemas.microsoft.com/office/drawing/2014/main" id="{4209C532-F199-3F4F-BEA3-14C39EED8B1A}"/>
+              </a:ext>
+            </a:extLst>
+          </p:cNvPr>
+          <p:cNvSpPr/>
+          <p:nvPr/>
+        </p:nvSpPr>
+        <p:spPr>
+          <a:xfrm>
+            <a:off x="6993285" y="5731556"/>
+            <a:ext cx="1931959" cy="192651"/>
+          </a:xfrm>
+          <a:prstGeom prst="roundRect">
+            <a:avLst/>
+          </a:prstGeom>
+          <a:solidFill>
+            <a:schemeClr val="bg2"/>
+          </a:solidFill>
+          <a:ln>
+            <a:solidFill>
+              <a:schemeClr val="bg1">
+                <a:lumMod val="50000"/>
+              </a:schemeClr>
+            </a:solidFill>
+          </a:ln>
+        </p:spPr>
+        <p:style>
+          <a:lnRef idx="2">
+            <a:schemeClr val="accent1">
+              <a:shade val="50000"/>
+            </a:schemeClr>
+          </a:lnRef>
+          <a:fillRef idx="1">
+            <a:schemeClr val="accent1"/>
+          </a:fillRef>
+          <a:effectRef idx="0">
+            <a:schemeClr val="accent1"/>
+          </a:effectRef>
+          <a:fontRef idx="minor">
+            <a:schemeClr val="lt1"/>
+          </a:fontRef>
+        </p:style>
+        <p:txBody>
+          <a:bodyPr rtlCol="0" anchor="ctr"/>
+          <a:lstStyle/>
+          <a:p>
+            <a:pPr algn="ctr"/>
+            <a:r>
+              <a:rPr lang="en-US" sz="1200" dirty="0">
+                <a:solidFill>
+                  <a:schemeClr val="tx1">
+                    <a:lumMod val="65000"/>
+                    <a:lumOff val="35000"/>
+                  </a:schemeClr>
+                </a:solidFill>
+              </a:rPr>
+              <a:t>Per polygon</a:t>
+            </a:r>
+          </a:p>
+        </p:txBody>
+      </p:sp>
+      <p:sp>
+        <p:nvSpPr>
+          <p:cNvPr id="22" name="Rounded Rectangle 15">
+            <a:extLst>
+              <a:ext uri="{FF2B5EF4-FFF2-40B4-BE49-F238E27FC236}">
+                <a16:creationId xmlns:a16="http://schemas.microsoft.com/office/drawing/2014/main" id="{4C52C572-9023-1242-9D39-0FB3D3A047CE}"/>
+              </a:ext>
+            </a:extLst>
+          </p:cNvPr>
+          <p:cNvSpPr/>
+          <p:nvPr/>
+        </p:nvSpPr>
+        <p:spPr>
+          <a:xfrm>
+            <a:off x="543041" y="5731555"/>
+            <a:ext cx="6236617" cy="192652"/>
+          </a:xfrm>
+          <a:prstGeom prst="roundRect">
+            <a:avLst/>
+          </a:prstGeom>
+          <a:solidFill>
+            <a:schemeClr val="bg2"/>
+          </a:solidFill>
+          <a:ln>
+            <a:solidFill>
+              <a:schemeClr val="bg1">
+                <a:lumMod val="50000"/>
+              </a:schemeClr>
+            </a:solidFill>
+          </a:ln>
+        </p:spPr>
+        <p:style>
+          <a:lnRef idx="2">
+            <a:schemeClr val="accent1">
+              <a:shade val="50000"/>
+            </a:schemeClr>
+          </a:lnRef>
+          <a:fillRef idx="1">
+            <a:schemeClr val="accent1"/>
+          </a:fillRef>
+          <a:effectRef idx="0">
+            <a:schemeClr val="accent1"/>
+          </a:effectRef>
+          <a:fontRef idx="minor">
+            <a:schemeClr val="lt1"/>
+          </a:fontRef>
+        </p:style>
+        <p:txBody>
+          <a:bodyPr rtlCol="0" anchor="ctr"/>
+          <a:lstStyle/>
+          <a:p>
+            <a:pPr algn="ctr"/>
+            <a:r>
+              <a:rPr lang="en-US" sz="1200" dirty="0">
+                <a:solidFill>
+                  <a:schemeClr val="tx1">
+                    <a:lumMod val="65000"/>
+                    <a:lumOff val="35000"/>
+                  </a:schemeClr>
+                </a:solidFill>
+              </a:rPr>
+              <a:t>Whole Dataset</a:t>
+            </a:r>
+          </a:p>
+        </p:txBody>
+      </p:sp>
+      <p:cxnSp>
+        <p:nvCxnSpPr>
+          <p:cNvPr id="23" name="Elbow Connector 18">
+            <a:extLst>
+              <a:ext uri="{FF2B5EF4-FFF2-40B4-BE49-F238E27FC236}">
+                <a16:creationId xmlns:a16="http://schemas.microsoft.com/office/drawing/2014/main" id="{BB147598-6002-D240-AF9F-FEDB4CBC47D0}"/>
+              </a:ext>
+            </a:extLst>
+          </p:cNvPr>
+          <p:cNvCxnSpPr>
+            <a:cxnSpLocks/>
+            <a:stCxn id="9" idx="3"/>
+            <a:endCxn id="11" idx="1"/>
+          </p:cNvCxnSpPr>
+          <p:nvPr/>
+        </p:nvCxnSpPr>
+        <p:spPr>
+          <a:xfrm flipV="1">
+            <a:off x="2160168" y="1774348"/>
+            <a:ext cx="726544" cy="1"/>
+          </a:xfrm>
+          <a:prstGeom prst="straightConnector1">
+            <a:avLst/>
+          </a:prstGeom>
+          <a:ln>
+            <a:solidFill>
+              <a:schemeClr val="bg1">
+                <a:lumMod val="50000"/>
+              </a:schemeClr>
+            </a:solidFill>
+            <a:headEnd type="none" w="med" len="med"/>
+            <a:tailEnd type="triangle" w="med" len="med"/>
+          </a:ln>
+        </p:spPr>
+        <p:style>
+          <a:lnRef idx="1">
+            <a:schemeClr val="accent1"/>
+          </a:lnRef>
+          <a:fillRef idx="0">
+            <a:schemeClr val="accent1"/>
+          </a:fillRef>
+          <a:effectRef idx="0">
+            <a:schemeClr val="accent1"/>
+          </a:effectRef>
+          <a:fontRef idx="minor">
+            <a:schemeClr val="tx1"/>
+          </a:fontRef>
+        </p:style>
+      </p:cxnSp>
+      <p:cxnSp>
+        <p:nvCxnSpPr>
+          <p:cNvPr id="26" name="Elbow Connector 18">
+            <a:extLst>
+              <a:ext uri="{FF2B5EF4-FFF2-40B4-BE49-F238E27FC236}">
+                <a16:creationId xmlns:a16="http://schemas.microsoft.com/office/drawing/2014/main" id="{8BC4FA37-D5E8-AD45-BB7B-DEC777BAC867}"/>
+              </a:ext>
+            </a:extLst>
+          </p:cNvPr>
+          <p:cNvCxnSpPr>
+            <a:cxnSpLocks/>
+          </p:cNvCxnSpPr>
+          <p:nvPr/>
+        </p:nvCxnSpPr>
+        <p:spPr>
+          <a:xfrm flipV="1">
+            <a:off x="2200992" y="4045717"/>
+            <a:ext cx="726544" cy="1"/>
+          </a:xfrm>
+          <a:prstGeom prst="straightConnector1">
+            <a:avLst/>
+          </a:prstGeom>
+          <a:ln>
+            <a:solidFill>
+              <a:schemeClr val="bg1">
+                <a:lumMod val="50000"/>
+              </a:schemeClr>
+            </a:solidFill>
+            <a:headEnd type="none" w="med" len="med"/>
+            <a:tailEnd type="triangle" w="med" len="med"/>
+          </a:ln>
+        </p:spPr>
+        <p:style>
+          <a:lnRef idx="1">
+            <a:schemeClr val="accent1"/>
+          </a:lnRef>
+          <a:fillRef idx="0">
+            <a:schemeClr val="accent1"/>
+          </a:fillRef>
+          <a:effectRef idx="0">
+            <a:schemeClr val="accent1"/>
+          </a:effectRef>
+          <a:fontRef idx="minor">
+            <a:schemeClr val="tx1"/>
+          </a:fontRef>
+        </p:style>
+      </p:cxnSp>
+      <p:cxnSp>
+        <p:nvCxnSpPr>
+          <p:cNvPr id="32" name="Elbow Connector 18">
+            <a:extLst>
+              <a:ext uri="{FF2B5EF4-FFF2-40B4-BE49-F238E27FC236}">
+                <a16:creationId xmlns:a16="http://schemas.microsoft.com/office/drawing/2014/main" id="{387ED9B0-D221-8F46-B3DD-F0EC45D35D94}"/>
+              </a:ext>
+            </a:extLst>
+          </p:cNvPr>
+          <p:cNvCxnSpPr>
+            <a:cxnSpLocks/>
+            <a:stCxn id="14" idx="2"/>
+            <a:endCxn id="15" idx="0"/>
+          </p:cNvCxnSpPr>
+          <p:nvPr/>
+        </p:nvCxnSpPr>
+        <p:spPr>
+          <a:xfrm flipH="1">
+            <a:off x="3635345" y="4304989"/>
+            <a:ext cx="1711" cy="304217"/>
+          </a:xfrm>
+          <a:prstGeom prst="straightConnector1">
+            <a:avLst/>
+          </a:prstGeom>
+          <a:ln>
+            <a:solidFill>
+              <a:schemeClr val="bg1">
+                <a:lumMod val="50000"/>
+              </a:schemeClr>
+            </a:solidFill>
+            <a:headEnd type="none" w="med" len="med"/>
+            <a:tailEnd type="triangle" w="med" len="med"/>
+          </a:ln>
+        </p:spPr>
+        <p:style>
+          <a:lnRef idx="1">
+            <a:schemeClr val="accent1"/>
+          </a:lnRef>
+          <a:fillRef idx="0">
+            <a:schemeClr val="accent1"/>
+          </a:fillRef>
+          <a:effectRef idx="0">
+            <a:schemeClr val="accent1"/>
+          </a:effectRef>
+          <a:fontRef idx="minor">
+            <a:schemeClr val="tx1"/>
+          </a:fontRef>
+        </p:style>
+      </p:cxnSp>
+      <p:cxnSp>
+        <p:nvCxnSpPr>
+          <p:cNvPr id="35" name="Elbow Connector 18">
+            <a:extLst>
+              <a:ext uri="{FF2B5EF4-FFF2-40B4-BE49-F238E27FC236}">
+                <a16:creationId xmlns:a16="http://schemas.microsoft.com/office/drawing/2014/main" id="{335C0979-3859-4346-A7D5-BD92453DCA1F}"/>
+              </a:ext>
+            </a:extLst>
+          </p:cNvPr>
+          <p:cNvCxnSpPr>
+            <a:cxnSpLocks/>
+            <a:stCxn id="15" idx="3"/>
+            <a:endCxn id="16" idx="1"/>
+          </p:cNvCxnSpPr>
+          <p:nvPr/>
+        </p:nvCxnSpPr>
+        <p:spPr>
+          <a:xfrm flipV="1">
+            <a:off x="4401207" y="2830784"/>
+            <a:ext cx="631088" cy="2071191"/>
+          </a:xfrm>
+          <a:prstGeom prst="bentConnector3">
+            <a:avLst>
+              <a:gd name="adj1" fmla="val 50000"/>
+            </a:avLst>
+          </a:prstGeom>
+          <a:ln>
+            <a:solidFill>
+              <a:schemeClr val="bg1">
+                <a:lumMod val="50000"/>
+              </a:schemeClr>
+            </a:solidFill>
+            <a:headEnd type="none" w="med" len="med"/>
+            <a:tailEnd type="triangle" w="med" len="med"/>
+          </a:ln>
+        </p:spPr>
+        <p:style>
+          <a:lnRef idx="1">
+            <a:schemeClr val="accent1"/>
+          </a:lnRef>
+          <a:fillRef idx="0">
+            <a:schemeClr val="accent1"/>
+          </a:fillRef>
+          <a:effectRef idx="0">
+            <a:schemeClr val="accent1"/>
+          </a:effectRef>
+          <a:fontRef idx="minor">
+            <a:schemeClr val="tx1"/>
+          </a:fontRef>
+        </p:style>
+      </p:cxnSp>
+      <p:cxnSp>
+        <p:nvCxnSpPr>
+          <p:cNvPr id="38" name="Elbow Connector 18">
+            <a:extLst>
+              <a:ext uri="{FF2B5EF4-FFF2-40B4-BE49-F238E27FC236}">
+                <a16:creationId xmlns:a16="http://schemas.microsoft.com/office/drawing/2014/main" id="{F2A3D3AC-D893-6C42-924F-10FF99BD3079}"/>
+              </a:ext>
+            </a:extLst>
+          </p:cNvPr>
+          <p:cNvCxnSpPr>
+            <a:cxnSpLocks/>
+            <a:stCxn id="11" idx="3"/>
+            <a:endCxn id="16" idx="1"/>
+          </p:cNvCxnSpPr>
+          <p:nvPr/>
+        </p:nvCxnSpPr>
+        <p:spPr>
+          <a:xfrm>
+            <a:off x="4418437" y="1774348"/>
+            <a:ext cx="613858" cy="1056436"/>
+          </a:xfrm>
+          <a:prstGeom prst="bentConnector3">
+            <a:avLst>
+              <a:gd name="adj1" fmla="val 48326"/>
+            </a:avLst>
+          </a:prstGeom>
+          <a:ln>
+            <a:solidFill>
+              <a:schemeClr val="bg1">
+                <a:lumMod val="50000"/>
+              </a:schemeClr>
+            </a:solidFill>
+            <a:headEnd type="none" w="med" len="med"/>
+            <a:tailEnd type="triangle" w="med" len="med"/>
+          </a:ln>
+        </p:spPr>
+        <p:style>
+          <a:lnRef idx="1">
+            <a:schemeClr val="accent1"/>
+          </a:lnRef>
+          <a:fillRef idx="0">
+            <a:schemeClr val="accent1"/>
+          </a:fillRef>
+          <a:effectRef idx="0">
+            <a:schemeClr val="accent1"/>
+          </a:effectRef>
+          <a:fontRef idx="minor">
+            <a:schemeClr val="tx1"/>
+          </a:fontRef>
+        </p:style>
+      </p:cxnSp>
+      <p:cxnSp>
+        <p:nvCxnSpPr>
+          <p:cNvPr id="41" name="Elbow Connector 18">
+            <a:extLst>
+              <a:ext uri="{FF2B5EF4-FFF2-40B4-BE49-F238E27FC236}">
+                <a16:creationId xmlns:a16="http://schemas.microsoft.com/office/drawing/2014/main" id="{C309AAA6-931C-DB42-8E41-4C5C7B3094CD}"/>
+              </a:ext>
+            </a:extLst>
+          </p:cNvPr>
+          <p:cNvCxnSpPr>
+            <a:cxnSpLocks/>
+          </p:cNvCxnSpPr>
+          <p:nvPr/>
+        </p:nvCxnSpPr>
+        <p:spPr>
+          <a:xfrm flipH="1">
+            <a:off x="5815389" y="3057352"/>
+            <a:ext cx="1" cy="273000"/>
+          </a:xfrm>
+          <a:prstGeom prst="straightConnector1">
+            <a:avLst/>
+          </a:prstGeom>
+          <a:ln>
+            <a:solidFill>
+              <a:schemeClr val="bg1">
+                <a:lumMod val="50000"/>
+              </a:schemeClr>
+            </a:solidFill>
+            <a:headEnd type="none" w="med" len="med"/>
+            <a:tailEnd type="triangle" w="med" len="med"/>
+          </a:ln>
+        </p:spPr>
+        <p:style>
+          <a:lnRef idx="1">
+            <a:schemeClr val="accent1"/>
+          </a:lnRef>
+          <a:fillRef idx="0">
+            <a:schemeClr val="accent1"/>
+          </a:fillRef>
+          <a:effectRef idx="0">
+            <a:schemeClr val="accent1"/>
+          </a:effectRef>
+          <a:fontRef idx="minor">
+            <a:schemeClr val="tx1"/>
+          </a:fontRef>
+        </p:style>
+      </p:cxnSp>
+      <p:cxnSp>
+        <p:nvCxnSpPr>
+          <p:cNvPr id="42" name="Elbow Connector 18">
+            <a:extLst>
+              <a:ext uri="{FF2B5EF4-FFF2-40B4-BE49-F238E27FC236}">
+                <a16:creationId xmlns:a16="http://schemas.microsoft.com/office/drawing/2014/main" id="{AB6329FD-B0B7-A949-9F4D-8D00EF42F8CE}"/>
+              </a:ext>
+            </a:extLst>
+          </p:cNvPr>
+          <p:cNvCxnSpPr>
+            <a:cxnSpLocks/>
+            <a:stCxn id="17" idx="3"/>
+            <a:endCxn id="18" idx="1"/>
+          </p:cNvCxnSpPr>
+          <p:nvPr/>
+        </p:nvCxnSpPr>
+        <p:spPr>
+          <a:xfrm>
+            <a:off x="6564021" y="3623121"/>
+            <a:ext cx="629380" cy="4328"/>
+          </a:xfrm>
+          <a:prstGeom prst="straightConnector1">
+            <a:avLst/>
+          </a:prstGeom>
+          <a:ln>
+            <a:solidFill>
+              <a:schemeClr val="bg1">
+                <a:lumMod val="50000"/>
+              </a:schemeClr>
+            </a:solidFill>
+            <a:headEnd type="none" w="med" len="med"/>
+            <a:tailEnd type="triangle" w="med" len="med"/>
+          </a:ln>
+        </p:spPr>
+        <p:style>
+          <a:lnRef idx="1">
+            <a:schemeClr val="accent1"/>
+          </a:lnRef>
+          <a:fillRef idx="0">
+            <a:schemeClr val="accent1"/>
+          </a:fillRef>
+          <a:effectRef idx="0">
+            <a:schemeClr val="accent1"/>
+          </a:effectRef>
+          <a:fontRef idx="minor">
+            <a:schemeClr val="tx1"/>
+          </a:fontRef>
+        </p:style>
+      </p:cxnSp>
+      <p:sp>
+        <p:nvSpPr>
+          <p:cNvPr id="45" name="Document 44">
+            <a:extLst>
+              <a:ext uri="{FF2B5EF4-FFF2-40B4-BE49-F238E27FC236}">
+                <a16:creationId xmlns:a16="http://schemas.microsoft.com/office/drawing/2014/main" id="{1F257782-7273-2F4B-9E13-3E5ACD818D87}"/>
+              </a:ext>
+            </a:extLst>
+          </p:cNvPr>
+          <p:cNvSpPr/>
+          <p:nvPr/>
+        </p:nvSpPr>
+        <p:spPr>
+          <a:xfrm>
+            <a:off x="7189979" y="4872377"/>
+            <a:ext cx="1531725" cy="585537"/>
+          </a:xfrm>
+          <a:prstGeom prst="flowChartDocument">
+            <a:avLst/>
+          </a:prstGeom>
+          <a:solidFill>
+            <a:schemeClr val="bg1"/>
+          </a:solidFill>
+          <a:ln>
+            <a:solidFill>
+              <a:schemeClr val="bg1">
+                <a:lumMod val="50000"/>
+              </a:schemeClr>
+            </a:solidFill>
+          </a:ln>
+        </p:spPr>
+        <p:style>
+          <a:lnRef idx="2">
+            <a:schemeClr val="accent1">
+              <a:shade val="50000"/>
+            </a:schemeClr>
+          </a:lnRef>
+          <a:fillRef idx="1">
+            <a:schemeClr val="accent1"/>
+          </a:fillRef>
+          <a:effectRef idx="0">
+            <a:schemeClr val="accent1"/>
+          </a:effectRef>
+          <a:fontRef idx="minor">
+            <a:schemeClr val="lt1"/>
+          </a:fontRef>
+        </p:style>
+        <p:txBody>
+          <a:bodyPr rtlCol="0" anchor="ctr"/>
+          <a:lstStyle/>
+          <a:p>
+            <a:pPr algn="ctr"/>
+            <a:r>
+              <a:rPr lang="en-US" sz="1200" dirty="0">
+                <a:solidFill>
+                  <a:schemeClr val="tx1">
+                    <a:lumMod val="65000"/>
+                    <a:lumOff val="35000"/>
+                  </a:schemeClr>
+                </a:solidFill>
+              </a:rPr>
+              <a:t>Bind results</a:t>
+            </a:r>
+          </a:p>
+          <a:p>
+            <a:pPr algn="ctr"/>
+            <a:r>
+              <a:rPr lang="en-US" sz="1200" dirty="0">
+                <a:solidFill>
+                  <a:schemeClr val="tx1">
+                    <a:lumMod val="65000"/>
+                    <a:lumOff val="35000"/>
+                  </a:schemeClr>
+                </a:solidFill>
+              </a:rPr>
+              <a:t>(base R)</a:t>
+            </a:r>
+          </a:p>
+        </p:txBody>
+      </p:sp>
+      <p:cxnSp>
+        <p:nvCxnSpPr>
+          <p:cNvPr id="47" name="Elbow Connector 18">
+            <a:extLst>
+              <a:ext uri="{FF2B5EF4-FFF2-40B4-BE49-F238E27FC236}">
+                <a16:creationId xmlns:a16="http://schemas.microsoft.com/office/drawing/2014/main" id="{479D347A-FA0F-4B4C-ACAA-EAAC76061433}"/>
+              </a:ext>
+            </a:extLst>
+          </p:cNvPr>
+          <p:cNvCxnSpPr>
+            <a:cxnSpLocks/>
+          </p:cNvCxnSpPr>
+          <p:nvPr/>
+        </p:nvCxnSpPr>
+        <p:spPr>
+          <a:xfrm flipH="1">
+            <a:off x="7976389" y="3909217"/>
+            <a:ext cx="1" cy="273000"/>
+          </a:xfrm>
+          <a:prstGeom prst="straightConnector1">
+            <a:avLst/>
+          </a:prstGeom>
+          <a:ln>
+            <a:solidFill>
+              <a:schemeClr val="bg1">
+                <a:lumMod val="50000"/>
+              </a:schemeClr>
+            </a:solidFill>
+            <a:headEnd type="none" w="med" len="med"/>
+            <a:tailEnd type="triangle" w="med" len="med"/>
+          </a:ln>
+        </p:spPr>
+        <p:style>
+          <a:lnRef idx="1">
+            <a:schemeClr val="accent1"/>
+          </a:lnRef>
+          <a:fillRef idx="0">
+            <a:schemeClr val="accent1"/>
+          </a:fillRef>
+          <a:effectRef idx="0">
+            <a:schemeClr val="accent1"/>
+          </a:effectRef>
+          <a:fontRef idx="minor">
+            <a:schemeClr val="tx1"/>
+          </a:fontRef>
+        </p:style>
+      </p:cxnSp>
+      <p:cxnSp>
+        <p:nvCxnSpPr>
+          <p:cNvPr id="48" name="Elbow Connector 18">
+            <a:extLst>
+              <a:ext uri="{FF2B5EF4-FFF2-40B4-BE49-F238E27FC236}">
+                <a16:creationId xmlns:a16="http://schemas.microsoft.com/office/drawing/2014/main" id="{3144A227-A9D9-C440-A930-F7AC086C39B6}"/>
+              </a:ext>
+            </a:extLst>
+          </p:cNvPr>
+          <p:cNvCxnSpPr>
+            <a:cxnSpLocks/>
+            <a:stCxn id="19" idx="2"/>
+            <a:endCxn id="45" idx="0"/>
+          </p:cNvCxnSpPr>
+          <p:nvPr/>
+        </p:nvCxnSpPr>
+        <p:spPr>
+          <a:xfrm flipH="1">
+            <a:off x="7955842" y="4681176"/>
+            <a:ext cx="1711" cy="191201"/>
+          </a:xfrm>
+          <a:prstGeom prst="straightConnector1">
+            <a:avLst/>
+          </a:prstGeom>
+          <a:ln>
+            <a:solidFill>
+              <a:schemeClr val="bg1">
+                <a:lumMod val="50000"/>
+              </a:schemeClr>
+            </a:solidFill>
+            <a:headEnd type="none" w="med" len="med"/>
+            <a:tailEnd type="triangle" w="med" len="med"/>
+          </a:ln>
+        </p:spPr>
+        <p:style>
+          <a:lnRef idx="1">
+            <a:schemeClr val="accent1"/>
+          </a:lnRef>
+          <a:fillRef idx="0">
+            <a:schemeClr val="accent1"/>
+          </a:fillRef>
+          <a:effectRef idx="0">
+            <a:schemeClr val="accent1"/>
+          </a:effectRef>
+          <a:fontRef idx="minor">
+            <a:schemeClr val="tx1"/>
+          </a:fontRef>
+        </p:style>
+      </p:cxnSp>
+      <p:sp>
+        <p:nvSpPr>
+          <p:cNvPr id="53" name="Oval 52">
+            <a:extLst>
+              <a:ext uri="{FF2B5EF4-FFF2-40B4-BE49-F238E27FC236}">
+                <a16:creationId xmlns:a16="http://schemas.microsoft.com/office/drawing/2014/main" id="{E4D2841C-1880-F345-8C5D-434F66EC6217}"/>
+              </a:ext>
+            </a:extLst>
+          </p:cNvPr>
+          <p:cNvSpPr/>
+          <p:nvPr/>
+        </p:nvSpPr>
+        <p:spPr>
+          <a:xfrm>
+            <a:off x="4284324" y="1362420"/>
+            <a:ext cx="266093" cy="267763"/>
+          </a:xfrm>
+          <a:prstGeom prst="ellipse">
+            <a:avLst/>
+          </a:prstGeom>
+        </p:spPr>
+        <p:style>
+          <a:lnRef idx="2">
+            <a:schemeClr val="accent4">
+              <a:shade val="50000"/>
+            </a:schemeClr>
+          </a:lnRef>
+          <a:fillRef idx="1">
+            <a:schemeClr val="accent4"/>
+          </a:fillRef>
+          <a:effectRef idx="0">
+            <a:schemeClr val="accent4"/>
+          </a:effectRef>
+          <a:fontRef idx="minor">
+            <a:schemeClr val="lt1"/>
+          </a:fontRef>
+        </p:style>
+        <p:txBody>
+          <a:bodyPr rtlCol="0" anchor="ctr"/>
+          <a:lstStyle/>
+          <a:p>
+            <a:pPr algn="ctr"/>
+            <a:endParaRPr lang="en-US"/>
+          </a:p>
+        </p:txBody>
+      </p:sp>
+      <p:sp>
+        <p:nvSpPr>
+          <p:cNvPr id="54" name="Oval 53">
+            <a:extLst>
+              <a:ext uri="{FF2B5EF4-FFF2-40B4-BE49-F238E27FC236}">
+                <a16:creationId xmlns:a16="http://schemas.microsoft.com/office/drawing/2014/main" id="{A1F74B93-9216-324F-8113-99CFCA9F5BFC}"/>
+              </a:ext>
+            </a:extLst>
+          </p:cNvPr>
+          <p:cNvSpPr/>
+          <p:nvPr/>
+        </p:nvSpPr>
+        <p:spPr>
+          <a:xfrm>
+            <a:off x="10501864" y="6060013"/>
+            <a:ext cx="266093" cy="267763"/>
+          </a:xfrm>
+          <a:prstGeom prst="ellipse">
+            <a:avLst/>
+          </a:prstGeom>
+        </p:spPr>
+        <p:style>
+          <a:lnRef idx="2">
+            <a:schemeClr val="accent4">
+              <a:shade val="50000"/>
+            </a:schemeClr>
+          </a:lnRef>
+          <a:fillRef idx="1">
+            <a:schemeClr val="accent4"/>
+          </a:fillRef>
+          <a:effectRef idx="0">
+            <a:schemeClr val="accent4"/>
+          </a:effectRef>
+          <a:fontRef idx="minor">
+            <a:schemeClr val="lt1"/>
+          </a:fontRef>
+        </p:style>
+        <p:txBody>
+          <a:bodyPr rtlCol="0" anchor="ctr"/>
+          <a:lstStyle/>
+          <a:p>
+            <a:pPr algn="ctr"/>
+            <a:endParaRPr lang="en-US"/>
+          </a:p>
+        </p:txBody>
+      </p:sp>
+      <p:sp>
+        <p:nvSpPr>
+          <p:cNvPr id="55" name="TextBox 54">
+            <a:extLst>
+              <a:ext uri="{FF2B5EF4-FFF2-40B4-BE49-F238E27FC236}">
+                <a16:creationId xmlns:a16="http://schemas.microsoft.com/office/drawing/2014/main" id="{4DAB9215-2039-4949-BB49-B9F7208F4BD4}"/>
+              </a:ext>
+            </a:extLst>
+          </p:cNvPr>
+          <p:cNvSpPr txBox="1"/>
+          <p:nvPr/>
+        </p:nvSpPr>
+        <p:spPr>
+          <a:xfrm>
+            <a:off x="10777797" y="6046796"/>
+            <a:ext cx="1387011" cy="276999"/>
+          </a:xfrm>
+          <a:prstGeom prst="rect">
+            <a:avLst/>
+          </a:prstGeom>
+          <a:noFill/>
+        </p:spPr>
+        <p:txBody>
+          <a:bodyPr wrap="square" rtlCol="0">
+            <a:spAutoFit/>
+          </a:bodyPr>
+          <a:lstStyle/>
+          <a:p>
+            <a:r>
+              <a:rPr lang="en-US" sz="1200" dirty="0"/>
+              <a:t>optional</a:t>
+            </a:r>
+          </a:p>
+        </p:txBody>
+      </p:sp>
+      <p:sp>
+        <p:nvSpPr>
+          <p:cNvPr id="56" name="TextBox 55">
+            <a:extLst>
+              <a:ext uri="{FF2B5EF4-FFF2-40B4-BE49-F238E27FC236}">
+                <a16:creationId xmlns:a16="http://schemas.microsoft.com/office/drawing/2014/main" id="{1073392A-4F73-274C-A4B9-397BC0827BBB}"/>
+              </a:ext>
+            </a:extLst>
+          </p:cNvPr>
+          <p:cNvSpPr txBox="1"/>
+          <p:nvPr/>
+        </p:nvSpPr>
+        <p:spPr>
+          <a:xfrm>
+            <a:off x="10424855" y="5731555"/>
+            <a:ext cx="660961" cy="276999"/>
+          </a:xfrm>
+          <a:prstGeom prst="rect">
+            <a:avLst/>
+          </a:prstGeom>
+          <a:noFill/>
+        </p:spPr>
+        <p:txBody>
+          <a:bodyPr wrap="square" rtlCol="0">
+            <a:spAutoFit/>
+          </a:bodyPr>
+          <a:lstStyle/>
+          <a:p>
+            <a:r>
+              <a:rPr lang="en-US" sz="1200" b="1" dirty="0"/>
+              <a:t>Legend</a:t>
+            </a:r>
+          </a:p>
+        </p:txBody>
+      </p:sp>
+    </p:spTree>
+    <p:extLst>
+      <p:ext uri="{BB962C8B-B14F-4D97-AF65-F5344CB8AC3E}">
+        <p14:creationId xmlns:p14="http://schemas.microsoft.com/office/powerpoint/2010/main" val="1971193116"/>
+      </p:ext>
+    </p:extLst>
+  </p:cSld>
+  <p:clrMapOvr>
+    <a:masterClrMapping/>
+  </p:clrMapOvr>
+</p:sld>
+</file>
+
 <file path=ppt/theme/theme1.xml><?xml version="1.0" encoding="utf-8"?>
 <a:theme xmlns:a="http://schemas.openxmlformats.org/drawingml/2006/main" name="Office Theme">
   <a:themeElements>

</xml_diff>